<commit_message>
a bit more notes
</commit_message>
<xml_diff>
--- a/defence/presentation_final.pptx
+++ b/defence/presentation_final.pptx
@@ -940,6 +940,28 @@
               <a:rPr lang="en-US" dirty="0"/>
               <a:t> order derivative of red line (response size) -&gt; seems to coincide with large amplitude (response time)</a:t>
             </a:r>
+          </a:p>
+          <a:p>
+            <a:r>
+              <a:rPr lang="en-US" dirty="0"/>
+              <a:t>Probably because </a:t>
+            </a:r>
+            <a:r>
+              <a:rPr lang="en-US"/>
+              <a:t>of JSON serialization -&gt; </a:t>
+            </a:r>
+            <a:r>
+              <a:rPr lang="en-US" dirty="0"/>
+              <a:t>Increase </a:t>
+            </a:r>
+            <a:r>
+              <a:rPr lang="en-US"/>
+              <a:t>response time, with </a:t>
+            </a:r>
+            <a:r>
+              <a:rPr lang="en-US" dirty="0"/>
+              <a:t>increase in response size</a:t>
+            </a:r>
             <a:endParaRPr lang="nl-NL" dirty="0"/>
           </a:p>
         </p:txBody>
@@ -1024,12 +1046,6 @@
           <a:bodyPr/>
           <a:lstStyle/>
           <a:p>
-            <a:r>
-              <a:rPr lang="nl-NL" dirty="0"/>
-              <a:t>PROFILING REVEALED…</a:t>
-            </a:r>
-          </a:p>
-          <a:p>
             <a:pPr marL="0" marR="0" lvl="0" indent="0" algn="l" defTabSz="914400" rtl="0" eaLnBrk="1" fontAlgn="auto" latinLnBrk="0" hangingPunct="1">
               <a:lnSpc>
                 <a:spcPct val="100000"/>
@@ -1049,7 +1065,7 @@
             </a:pPr>
             <a:r>
               <a:rPr lang="en-US" dirty="0"/>
-              <a:t>Max total 40%  -&gt; leaves 60% free -&gt; multi-core processing optimization</a:t>
+              <a:t>Max total 40%  -&gt; leaves 60% free -&gt; if CPU bound -&gt; room for multi-core processing optimization</a:t>
             </a:r>
           </a:p>
         </p:txBody>
@@ -1568,6 +1584,20 @@
               <a:rPr lang="en-US" dirty="0"/>
               <a:t>API -&gt; modularity &amp; maintain-ability</a:t>
             </a:r>
+          </a:p>
+          <a:p>
+            <a:r>
+              <a:rPr lang="en-US" dirty="0"/>
+              <a:t>Android OS -&gt; cross-compile (not exactly </a:t>
+            </a:r>
+            <a:r>
+              <a:rPr lang="en-US" dirty="0" err="1"/>
+              <a:t>linux</a:t>
+            </a:r>
+            <a:r>
+              <a:rPr lang="en-US" dirty="0"/>
+              <a:t>)</a:t>
+            </a:r>
             <a:endParaRPr lang="nl-NL" dirty="0"/>
           </a:p>
         </p:txBody>
@@ -1950,6 +1980,29 @@
               <a:t>quick? Scalable?</a:t>
             </a:r>
           </a:p>
+          <a:p>
+            <a:pPr marL="0" marR="0" lvl="0" indent="0" algn="l" defTabSz="914400" rtl="0" eaLnBrk="1" fontAlgn="auto" latinLnBrk="0" hangingPunct="1">
+              <a:lnSpc>
+                <a:spcPct val="100000"/>
+              </a:lnSpc>
+              <a:spcBef>
+                <a:spcPts val="0"/>
+              </a:spcBef>
+              <a:spcAft>
+                <a:spcPts val="0"/>
+              </a:spcAft>
+              <a:buClrTx/>
+              <a:buSzTx/>
+              <a:buFontTx/>
+              <a:buNone/>
+              <a:tabLst/>
+              <a:defRPr/>
+            </a:pPr>
+            <a:r>
+              <a:rPr lang="en-US" dirty="0"/>
+              <a:t>Clusters of 9?</a:t>
+            </a:r>
+          </a:p>
         </p:txBody>
       </p:sp>
       <p:sp>
@@ -2237,6 +2290,85 @@
             <a:r>
               <a:rPr lang="nl-NL" dirty="0"/>
               <a:t> consensus</a:t>
+            </a:r>
+          </a:p>
+          <a:p>
+            <a:pPr marL="0" marR="0" lvl="0" indent="0" algn="l" defTabSz="914400" rtl="0" eaLnBrk="1" fontAlgn="auto" latinLnBrk="0" hangingPunct="1">
+              <a:lnSpc>
+                <a:spcPct val="100000"/>
+              </a:lnSpc>
+              <a:spcBef>
+                <a:spcPts val="0"/>
+              </a:spcBef>
+              <a:spcAft>
+                <a:spcPts val="0"/>
+              </a:spcAft>
+              <a:buClrTx/>
+              <a:buSzTx/>
+              <a:buFontTx/>
+              <a:buNone/>
+              <a:tabLst/>
+              <a:defRPr/>
+            </a:pPr>
+            <a:r>
+              <a:rPr lang="en-US" dirty="0"/>
+              <a:t>N</a:t>
+            </a:r>
+            <a:r>
+              <a:rPr lang="nl-NL" dirty="0" err="1"/>
+              <a:t>exus</a:t>
+            </a:r>
+            <a:r>
+              <a:rPr lang="nl-NL" dirty="0"/>
+              <a:t> 6 starts </a:t>
+            </a:r>
+            <a:r>
+              <a:rPr lang="nl-NL" dirty="0" err="1"/>
+              <a:t>with</a:t>
+            </a:r>
+            <a:r>
+              <a:rPr lang="nl-NL" dirty="0"/>
+              <a:t> 40 transactions per second </a:t>
+            </a:r>
+            <a:r>
+              <a:rPr lang="nl-NL" dirty="0" err="1"/>
+              <a:t>and</a:t>
+            </a:r>
+            <a:r>
+              <a:rPr lang="nl-NL" dirty="0"/>
+              <a:t> </a:t>
+            </a:r>
+            <a:r>
+              <a:rPr lang="nl-NL" dirty="0" err="1"/>
+              <a:t>ends</a:t>
+            </a:r>
+            <a:r>
+              <a:rPr lang="nl-NL" dirty="0"/>
+              <a:t> </a:t>
+            </a:r>
+            <a:r>
+              <a:rPr lang="nl-NL" dirty="0" err="1"/>
+              <a:t>with</a:t>
+            </a:r>
+            <a:r>
+              <a:rPr lang="nl-NL" dirty="0"/>
+              <a:t> 3,5 ; </a:t>
+            </a:r>
+            <a:r>
+              <a:rPr lang="nl-NL" dirty="0" err="1"/>
+              <a:t>only</a:t>
+            </a:r>
+            <a:r>
+              <a:rPr lang="nl-NL" dirty="0"/>
+              <a:t> 1 per 10 minutes </a:t>
+            </a:r>
+            <a:r>
+              <a:rPr lang="nl-NL" dirty="0" err="1"/>
+              <a:t>needed</a:t>
+            </a:r>
+            <a:r>
+              <a:rPr lang="nl-NL" dirty="0"/>
+              <a:t>!</a:t>
             </a:r>
             <a:endParaRPr lang="en-US" dirty="0"/>
           </a:p>
@@ -5480,7 +5612,6 @@
               <a:rPr lang="en-US" dirty="0"/>
               <a:t>Potential user base of millions of people</a:t>
             </a:r>
-            <a:endParaRPr lang="en-US" dirty="0"/>
           </a:p>
         </p:txBody>
       </p:sp>

</xml_diff>